<commit_message>
added taste of danforth content TODO: replace menu href with correct link
</commit_message>
<xml_diff>
--- a/logo.pptx
+++ b/logo.pptx
@@ -3349,6 +3349,60 @@
       </p:grpSpPr>
       <p:sp>
         <p:nvSpPr>
+          <p:cNvPr id="3" name="Rectangle 2">
+            <a:extLst>
+              <a:ext uri="{FF2B5EF4-FFF2-40B4-BE49-F238E27FC236}">
+                <a16:creationId xmlns:a16="http://schemas.microsoft.com/office/drawing/2014/main" id="{C5FB01B0-CDBB-5264-DD72-7E3E4D4642CD}"/>
+              </a:ext>
+            </a:extLst>
+          </p:cNvPr>
+          <p:cNvSpPr/>
+          <p:nvPr/>
+        </p:nvSpPr>
+        <p:spPr>
+          <a:xfrm>
+            <a:off x="-1" y="0"/>
+            <a:ext cx="12191999" cy="6858000"/>
+          </a:xfrm>
+          <a:prstGeom prst="rect">
+            <a:avLst/>
+          </a:prstGeom>
+          <a:solidFill>
+            <a:schemeClr val="accent1">
+              <a:lumMod val="50000"/>
+            </a:schemeClr>
+          </a:solidFill>
+          <a:ln>
+            <a:noFill/>
+          </a:ln>
+        </p:spPr>
+        <p:style>
+          <a:lnRef idx="2">
+            <a:schemeClr val="accent1">
+              <a:shade val="15000"/>
+            </a:schemeClr>
+          </a:lnRef>
+          <a:fillRef idx="1">
+            <a:schemeClr val="accent1"/>
+          </a:fillRef>
+          <a:effectRef idx="0">
+            <a:schemeClr val="accent1"/>
+          </a:effectRef>
+          <a:fontRef idx="minor">
+            <a:schemeClr val="lt1"/>
+          </a:fontRef>
+        </p:style>
+        <p:txBody>
+          <a:bodyPr rtlCol="0" anchor="ctr"/>
+          <a:lstStyle/>
+          <a:p>
+            <a:pPr algn="ctr"/>
+            <a:endParaRPr lang="en-CA"/>
+          </a:p>
+        </p:txBody>
+      </p:sp>
+      <p:sp>
+        <p:nvSpPr>
           <p:cNvPr id="2" name="Title 1">
             <a:extLst>
               <a:ext uri="{FF2B5EF4-FFF2-40B4-BE49-F238E27FC236}">
@@ -3376,19 +3430,36 @@
           <a:lstStyle/>
           <a:p>
             <a:r>
-              <a:rPr lang="en-US" sz="13800" b="1" spc="-1200" dirty="0">
+              <a:rPr lang="en-US" sz="13800" b="1" spc="-300" dirty="0">
                 <a:solidFill>
-                  <a:srgbClr val="C00000"/>
+                  <a:schemeClr val="bg1"/>
                 </a:solidFill>
-                <a:latin typeface="Comfortaa" pitchFamily="2" charset="0"/>
+                <a:latin typeface="Arial Narrow" panose="020B0606020202030204" pitchFamily="34" charset="0"/>
               </a:rPr>
-              <a:t>Halal Momo</a:t>
-            </a:r>
-            <a:endParaRPr lang="en-CA" sz="13800" b="1" spc="-1200" dirty="0">
+              <a:t>TASTE OF</a:t>
+            </a:r>
+            <a:br>
+              <a:rPr lang="en-US" sz="13800" b="1" spc="-300" dirty="0">
+                <a:solidFill>
+                  <a:schemeClr val="bg1"/>
+                </a:solidFill>
+                <a:latin typeface="Arial Narrow" panose="020B0606020202030204" pitchFamily="34" charset="0"/>
+              </a:rPr>
+            </a:br>
+            <a:r>
+              <a:rPr lang="en-US" sz="13800" b="1" spc="-300" dirty="0">
+                <a:solidFill>
+                  <a:schemeClr val="bg1"/>
+                </a:solidFill>
+                <a:latin typeface="Arial Narrow" panose="020B0606020202030204" pitchFamily="34" charset="0"/>
+              </a:rPr>
+              <a:t>DANFORTH</a:t>
+            </a:r>
+            <a:endParaRPr lang="en-CA" sz="13800" b="1" spc="-300" dirty="0">
               <a:solidFill>
-                <a:srgbClr val="C00000"/>
+                <a:schemeClr val="bg1"/>
               </a:solidFill>
-              <a:latin typeface="Comfortaa" pitchFamily="2" charset="0"/>
+              <a:latin typeface="Arial Narrow" panose="020B0606020202030204" pitchFamily="34" charset="0"/>
             </a:endParaRPr>
           </a:p>
         </p:txBody>

</xml_diff>